<commit_message>
added input from afternoon session
</commit_message>
<xml_diff>
--- a/Tooling-Landscape/Meeting-Material/Meeting-20201118/Presented-slides-2020-11-18.pptx
+++ b/Tooling-Landscape/Meeting-Material/Meeting-20201118/Presented-slides-2020-11-18.pptx
@@ -23,7 +23,7 @@
   <p:sldSz cx="12198350" cy="6858000"/>
   <p:notesSz cx="7102475" cy="10234613"/>
   <p:custDataLst>
-    <p:custData r:id="rId18"/>
+    <p:custData r:id="rId12"/>
     <p:tags r:id="rId30"/>
   </p:custDataLst>
   <p:defaultTextStyle>
@@ -164,7 +164,7 @@
             <a:srgbClr val="A4A3A4"/>
           </p15:clr>
         </p15:guide>
-        <p15:guide id="3" orient="horz" pos="2432">
+        <p15:guide id="3" orient="horz" pos="2409" userDrawn="1">
           <p15:clr>
             <a:srgbClr val="A4A3A4"/>
           </p15:clr>
@@ -1172,7 +1172,7 @@
           <a:graphicData uri="http://schemas.openxmlformats.org/presentationml/2006/ole">
             <mc:AlternateContent xmlns:mc="http://schemas.openxmlformats.org/markup-compatibility/2006">
               <mc:Choice xmlns:v="urn:schemas-microsoft-com:vml" Requires="v">
-                <p:oleObj spid="_x0000_s2513" name="think-cell Folie" r:id="rId7" imgW="360" imgH="360" progId="">
+                <p:oleObj spid="_x0000_s2516" name="think-cell Folie" r:id="rId7" imgW="360" imgH="360" progId="">
                   <p:embed/>
                 </p:oleObj>
               </mc:Choice>
@@ -2610,6 +2610,94 @@
           </a:p>
         </p:txBody>
       </p:sp>
+      <p:sp>
+        <p:nvSpPr>
+          <p:cNvPr id="3" name="Textfeld 2">
+            <a:extLst>
+              <a:ext uri="{FF2B5EF4-FFF2-40B4-BE49-F238E27FC236}">
+                <a16:creationId xmlns:a16="http://schemas.microsoft.com/office/drawing/2014/main" id="{C3960517-8839-5441-8238-086FA862C2F1}"/>
+              </a:ext>
+            </a:extLst>
+          </p:cNvPr>
+          <p:cNvSpPr txBox="1"/>
+          <p:nvPr userDrawn="1"/>
+        </p:nvSpPr>
+        <p:spPr>
+          <a:xfrm>
+            <a:off x="11115040" y="6624320"/>
+            <a:ext cx="0" cy="0"/>
+          </a:xfrm>
+          <a:prstGeom prst="rect">
+            <a:avLst/>
+          </a:prstGeom>
+          <a:noFill/>
+        </p:spPr>
+        <p:txBody>
+          <a:bodyPr wrap="none" lIns="0" tIns="0" rIns="0" bIns="0" rtlCol="0">
+            <a:noAutofit/>
+          </a:bodyPr>
+          <a:lstStyle/>
+          <a:p>
+            <a:pPr>
+              <a:lnSpc>
+                <a:spcPct val="110000"/>
+              </a:lnSpc>
+              <a:spcBef>
+                <a:spcPts val="0"/>
+              </a:spcBef>
+            </a:pPr>
+            <a:endParaRPr lang="en-US" sz="1400" dirty="0" err="1">
+              <a:solidFill>
+                <a:schemeClr val="tx1"/>
+              </a:solidFill>
+            </a:endParaRPr>
+          </a:p>
+        </p:txBody>
+      </p:sp>
+      <p:sp>
+        <p:nvSpPr>
+          <p:cNvPr id="5" name="Textfeld 4">
+            <a:extLst>
+              <a:ext uri="{FF2B5EF4-FFF2-40B4-BE49-F238E27FC236}">
+                <a16:creationId xmlns:a16="http://schemas.microsoft.com/office/drawing/2014/main" id="{F393F712-CCA2-E94D-ADE3-AF1BABDCA522}"/>
+              </a:ext>
+            </a:extLst>
+          </p:cNvPr>
+          <p:cNvSpPr txBox="1"/>
+          <p:nvPr userDrawn="1"/>
+        </p:nvSpPr>
+        <p:spPr>
+          <a:xfrm>
+            <a:off x="11155680" y="6675120"/>
+            <a:ext cx="0" cy="0"/>
+          </a:xfrm>
+          <a:prstGeom prst="rect">
+            <a:avLst/>
+          </a:prstGeom>
+          <a:noFill/>
+        </p:spPr>
+        <p:txBody>
+          <a:bodyPr wrap="none" lIns="0" tIns="0" rIns="0" bIns="0" rtlCol="0">
+            <a:noAutofit/>
+          </a:bodyPr>
+          <a:lstStyle/>
+          <a:p>
+            <a:pPr>
+              <a:lnSpc>
+                <a:spcPct val="110000"/>
+              </a:lnSpc>
+              <a:spcBef>
+                <a:spcPts val="0"/>
+              </a:spcBef>
+            </a:pPr>
+            <a:endParaRPr lang="en-US" sz="1400" dirty="0" err="1">
+              <a:solidFill>
+                <a:schemeClr val="tx1"/>
+              </a:solidFill>
+            </a:endParaRPr>
+          </a:p>
+        </p:txBody>
+      </p:sp>
     </p:spTree>
     <p:custDataLst>
       <p:tags r:id="rId1"/>
@@ -2676,7 +2764,7 @@
           <a:graphicData uri="http://schemas.openxmlformats.org/presentationml/2006/ole">
             <mc:AlternateContent xmlns:mc="http://schemas.openxmlformats.org/markup-compatibility/2006">
               <mc:Choice xmlns:v="urn:schemas-microsoft-com:vml" Requires="v">
-                <p:oleObj spid="_x0000_s1513" name="think-cell Folie" r:id="rId36" imgW="360" imgH="360" progId="">
+                <p:oleObj spid="_x0000_s1517" name="think-cell Folie" r:id="rId36" imgW="360" imgH="360" progId="">
                   <p:embed/>
                 </p:oleObj>
               </mc:Choice>
@@ -4281,7 +4369,7 @@
                 </a:solidFill>
                 <a:sym typeface="Wingdings"/>
               </a:rPr>
-              <a:t>Oliver Fendt</a:t>
+              <a:t>Jan Thielscher</a:t>
             </a:r>
             <a:endParaRPr lang="en-US" sz="1000" noProof="0" dirty="0">
               <a:solidFill>
@@ -6476,6 +6564,68 @@
           </a:p>
         </p:txBody>
       </p:sp>
+      <p:sp>
+        <p:nvSpPr>
+          <p:cNvPr id="4" name="Textfeld 3">
+            <a:extLst>
+              <a:ext uri="{FF2B5EF4-FFF2-40B4-BE49-F238E27FC236}">
+                <a16:creationId xmlns:a16="http://schemas.microsoft.com/office/drawing/2014/main" id="{5B31E175-38BD-AC43-8E85-B3A0911C4AEA}"/>
+              </a:ext>
+            </a:extLst>
+          </p:cNvPr>
+          <p:cNvSpPr txBox="1"/>
+          <p:nvPr/>
+        </p:nvSpPr>
+        <p:spPr>
+          <a:xfrm>
+            <a:off x="1306286" y="3955551"/>
+            <a:ext cx="914400" cy="914400"/>
+          </a:xfrm>
+          <a:prstGeom prst="rect">
+            <a:avLst/>
+          </a:prstGeom>
+          <a:noFill/>
+        </p:spPr>
+        <p:txBody>
+          <a:bodyPr wrap="none" lIns="0" tIns="0" rIns="0" bIns="0" rtlCol="0">
+            <a:noAutofit/>
+          </a:bodyPr>
+          <a:lstStyle/>
+          <a:p>
+            <a:pPr>
+              <a:lnSpc>
+                <a:spcPct val="110000"/>
+              </a:lnSpc>
+              <a:spcBef>
+                <a:spcPts val="0"/>
+              </a:spcBef>
+            </a:pPr>
+            <a:r>
+              <a:rPr lang="en-US" sz="1400" dirty="0">
+                <a:solidFill>
+                  <a:schemeClr val="tx1"/>
+                </a:solidFill>
+              </a:rPr>
+              <a:t>Please note: Afternoon session did not get recorded. Discussion results of both events have been added </a:t>
+            </a:r>
+            <a:br>
+              <a:rPr lang="en-US" sz="1400" dirty="0">
+                <a:solidFill>
+                  <a:schemeClr val="tx1"/>
+                </a:solidFill>
+              </a:rPr>
+            </a:br>
+            <a:r>
+              <a:rPr lang="en-US" sz="1400" dirty="0">
+                <a:solidFill>
+                  <a:schemeClr val="tx1"/>
+                </a:solidFill>
+              </a:rPr>
+              <a:t>in this slide deck</a:t>
+            </a:r>
+          </a:p>
+        </p:txBody>
+      </p:sp>
     </p:spTree>
     <p:extLst>
       <p:ext uri="{BB962C8B-B14F-4D97-AF65-F5344CB8AC3E}">
@@ -7491,7 +7641,7 @@
         <p:spPr>
           <a:xfrm>
             <a:off x="627062" y="1412875"/>
-            <a:ext cx="11088687" cy="5109091"/>
+            <a:ext cx="11088687" cy="5032147"/>
           </a:xfrm>
         </p:spPr>
         <p:txBody>
@@ -7500,7 +7650,7 @@
           <a:p>
             <a:r>
               <a:rPr lang="en-US" sz="1600" dirty="0"/>
-              <a:t>What would be required by a public meta data repository to be reliable?</a:t>
+              <a:t>Question to the audience: What would be required by a public meta data repository to be reliable?</a:t>
             </a:r>
           </a:p>
           <a:p>
@@ -7539,7 +7689,7 @@
             </a:pPr>
             <a:r>
               <a:rPr lang="en-US" sz="1600" dirty="0"/>
-              <a:t>What has been executing the scan?</a:t>
+              <a:t>Who has been executing the scan?</a:t>
             </a:r>
           </a:p>
           <a:p>
@@ -7557,20 +7707,26 @@
               <a:buFont typeface="Arial" panose="020B0604020202020204" pitchFamily="34" charset="0"/>
               <a:buChar char="•"/>
             </a:pPr>
+            <a:r>
+              <a:rPr lang="en-US" sz="1600" dirty="0"/>
+              <a:t>Provision of additional meta data for the interpretation of how to apply (might be company specific)</a:t>
+            </a:r>
+          </a:p>
+          <a:p>
             <a:endParaRPr lang="en-US" sz="600" dirty="0"/>
           </a:p>
           <a:p>
-            <a:pPr marL="465138" lvl="1" indent="-285750">
+            <a:pPr marL="285750" indent="-285750">
               <a:buFont typeface="Arial" panose="020B0604020202020204" pitchFamily="34" charset="0"/>
               <a:buChar char="•"/>
             </a:pPr>
             <a:r>
               <a:rPr lang="en-US" sz="1600" dirty="0"/>
-              <a:t>Potential mechanism could be like crowd sourced, voting or pull requests</a:t>
+              <a:t>Potential mechanism could be like crowd sourced, voting or the pull requests in Clearly Defined (which so far do not seem to be widely adopted)</a:t>
             </a:r>
           </a:p>
           <a:p>
-            <a:pPr marL="465138" lvl="1" indent="-285750">
+            <a:pPr marL="285750" indent="-285750">
               <a:buFont typeface="Arial" panose="020B0604020202020204" pitchFamily="34" charset="0"/>
               <a:buChar char="•"/>
             </a:pPr>
@@ -7580,30 +7736,13 @@
             </a:r>
           </a:p>
           <a:p>
-            <a:pPr marL="465138" lvl="1" indent="-285750">
+            <a:pPr marL="285750" indent="-285750">
               <a:buFont typeface="Arial" panose="020B0604020202020204" pitchFamily="34" charset="0"/>
               <a:buChar char="•"/>
             </a:pPr>
-            <a:endParaRPr lang="en-US" sz="1600" dirty="0"/>
-          </a:p>
-          <a:p>
-            <a:pPr marL="465138" lvl="1" indent="-285750">
-              <a:buFont typeface="Arial" panose="020B0604020202020204" pitchFamily="34" charset="0"/>
-              <a:buChar char="•"/>
-            </a:pPr>
             <a:r>
               <a:rPr lang="en-US" sz="1600" dirty="0"/>
-              <a:t>Link between original source and binary build needs to be kept, so that the applicability of meta information can be ensured</a:t>
-            </a:r>
-          </a:p>
-          <a:p>
-            <a:pPr marL="465138" lvl="1" indent="-285750">
-              <a:buFont typeface="Arial" panose="020B0604020202020204" pitchFamily="34" charset="0"/>
-              <a:buChar char="•"/>
-            </a:pPr>
-            <a:r>
-              <a:rPr lang="en-US" sz="1600" dirty="0"/>
-              <a:t>E.g. SPDX keeps hashes on file-level to ensure which sources have been used for a particular binary</a:t>
+              <a:t>A link between original source and binary build should be available, so that the applicability of meta information can be ensured, e.g. SPDX keeps hashes on file-level to ensure which sources have been used for a particular binary</a:t>
             </a:r>
           </a:p>
           <a:p>
@@ -7698,8 +7837,8 @@
         </p:nvSpPr>
         <p:spPr>
           <a:xfrm>
-            <a:off x="627062" y="1412875"/>
-            <a:ext cx="11088687" cy="3539430"/>
+            <a:off x="627062" y="1268413"/>
+            <a:ext cx="11088687" cy="4478149"/>
           </a:xfrm>
         </p:spPr>
         <p:txBody>
@@ -7707,29 +7846,30 @@
           <a:lstStyle/>
           <a:p>
             <a:r>
-              <a:rPr lang="en-US" sz="1600" dirty="0"/>
-              <a:t>Say refers to an interesting statement on the publication of sources by Heather Meeker</a:t>
+              <a:rPr lang="en-US" dirty="0" err="1"/>
+              <a:t>Samy</a:t>
+            </a:r>
+            <a:r>
+              <a:rPr lang="en-US" dirty="0"/>
+              <a:t> refers to an interesting statement by Heather Meeker, where she </a:t>
             </a:r>
             <a:br>
-              <a:rPr lang="en-US" sz="1600" dirty="0"/>
+              <a:rPr lang="en-US" dirty="0"/>
             </a:br>
             <a:r>
-              <a:rPr lang="de-DE" u="sng" dirty="0">
+              <a:rPr lang="de-DE" sz="1200" u="sng" dirty="0">
                 <a:hlinkClick r:id="rId2" tooltip="https://fossa-com.cdn.ampproject.org/c/s/fossa.com/blog/heather-meeker-open-source-license-notices-automation/amp/"/>
               </a:rPr>
               <a:t>https://fossa-com.cdn.ampproject.org/c/s/fossa.com/blog/heather-meeker-open-source-license-notices-automation/amp/</a:t>
             </a:r>
-            <a:endParaRPr lang="de-DE" dirty="0"/>
+            <a:br>
+              <a:rPr lang="de-DE" sz="1200" u="sng" dirty="0"/>
+            </a:br>
+            <a:endParaRPr lang="en-US" dirty="0"/>
           </a:p>
           <a:p>
-            <a:endParaRPr lang="en-US" sz="1600"/>
-          </a:p>
-          <a:p>
-            <a:endParaRPr lang="en-US" sz="1600" dirty="0"/>
-          </a:p>
-          <a:p>
-            <a:r>
-              <a:rPr lang="en-US" sz="1600" dirty="0"/>
+            <a:r>
+              <a:rPr lang="en-US" dirty="0"/>
               <a:t>Steven requested that it might be useful to have a kind of best practices for Open Source Office handling of OS projects failing to comply with their own diligence.</a:t>
             </a:r>
           </a:p>
@@ -7739,7 +7879,7 @@
               <a:buChar char="•"/>
             </a:pPr>
             <a:r>
-              <a:rPr lang="en-US" sz="1600" dirty="0"/>
+              <a:rPr lang="en-US" sz="1400" dirty="0"/>
               <a:t>How to best contact OS-projects to fix compliance issues (e.g. pull request or issue?)</a:t>
             </a:r>
           </a:p>
@@ -7748,19 +7888,47 @@
               <a:buFont typeface="Arial" panose="020B0604020202020204" pitchFamily="34" charset="0"/>
               <a:buChar char="•"/>
             </a:pPr>
-            <a:endParaRPr lang="en-US" sz="1600" dirty="0"/>
+            <a:r>
+              <a:rPr lang="en-US" sz="1400" dirty="0"/>
+              <a:t>How to handle documentation licenses that might not comply with the code license, given the doc shall be supplied with the source?</a:t>
+            </a:r>
+          </a:p>
+          <a:p>
+            <a:endParaRPr lang="en-US" dirty="0"/>
+          </a:p>
+          <a:p>
+            <a:r>
+              <a:rPr lang="en-US" dirty="0"/>
+              <a:t>Daniel reports that he did not receive any issues / pull requests to support the collection of test cases whereby the collection will be a great approach to  improve quality of scanners and tooling.</a:t>
+            </a:r>
           </a:p>
           <a:p>
             <a:pPr marL="465138" lvl="1" indent="-285750">
               <a:buFont typeface="Arial" panose="020B0604020202020204" pitchFamily="34" charset="0"/>
               <a:buChar char="•"/>
             </a:pPr>
-            <a:endParaRPr lang="en-US" sz="1600" dirty="0"/>
+            <a:r>
+              <a:rPr lang="en-US" sz="1400" dirty="0"/>
+              <a:t>Please review </a:t>
+            </a:r>
+            <a:r>
+              <a:rPr lang="en-US" sz="1400" dirty="0">
+                <a:hlinkClick r:id="rId3"/>
+              </a:rPr>
+              <a:t>https://github.com/Open-Source-Compliance/tdosca</a:t>
+            </a:r>
+            <a:r>
+              <a:rPr lang="en-US" sz="1400" dirty="0"/>
+              <a:t> </a:t>
+            </a:r>
           </a:p>
           <a:p>
-            <a:r>
-              <a:rPr lang="en-US" sz="1600" dirty="0"/>
-              <a:t>Daniel reports that he did not receive any issues / pull requests to support the collection of test cases whereby the collection will be a great approach to  improve quality of scanners and tooling.</a:t>
+            <a:endParaRPr lang="en-US" dirty="0"/>
+          </a:p>
+          <a:p>
+            <a:r>
+              <a:rPr lang="en-US" dirty="0"/>
+              <a:t>Garry reports during the afternoon session several updates around SPDX tooling. There are new versions available and he encourages the use of them. Feedback is requested.</a:t>
             </a:r>
           </a:p>
           <a:p>
@@ -7769,18 +7937,52 @@
               <a:buChar char="•"/>
             </a:pPr>
             <a:r>
-              <a:rPr lang="en-US" sz="1600" dirty="0"/>
-              <a:t>Please review </a:t>
-            </a:r>
-            <a:r>
-              <a:rPr lang="en-US" sz="1600" dirty="0">
-                <a:hlinkClick r:id="rId3"/>
+              <a:rPr lang="en-US" sz="1400" dirty="0"/>
+              <a:t>SPDX CLI: </a:t>
+            </a:r>
+            <a:r>
+              <a:rPr lang="en-US" sz="1400" dirty="0">
+                <a:hlinkClick r:id="rId4"/>
               </a:rPr>
-              <a:t>https://github.com/Open-Source-Compliance/tdosca</a:t>
-            </a:r>
-            <a:r>
-              <a:rPr lang="en-US" sz="1600" dirty="0"/>
+              <a:t>https://github.com/spdx/tools-java</a:t>
+            </a:r>
+            <a:r>
+              <a:rPr lang="en-US" sz="1400" dirty="0"/>
               <a:t> </a:t>
+            </a:r>
+          </a:p>
+          <a:p>
+            <a:pPr marL="465138" lvl="1" indent="-285750">
+              <a:buFont typeface="Arial" panose="020B0604020202020204" pitchFamily="34" charset="0"/>
+              <a:buChar char="•"/>
+            </a:pPr>
+            <a:r>
+              <a:rPr lang="en-US" sz="1400" dirty="0"/>
+              <a:t>SPDX library: </a:t>
+            </a:r>
+            <a:r>
+              <a:rPr lang="en-US" sz="1400" dirty="0">
+                <a:hlinkClick r:id="rId5"/>
+              </a:rPr>
+              <a:t>https://github.com/spdx/Spdx-Java-Library</a:t>
+            </a:r>
+            <a:r>
+              <a:rPr lang="en-US" sz="1400" dirty="0"/>
+              <a:t> </a:t>
+            </a:r>
+          </a:p>
+          <a:p>
+            <a:r>
+              <a:rPr lang="en-US" dirty="0"/>
+              <a:t>He also points out that the SPDX licenses list will add additional tags and meta data in its next release (approx. Dec 1</a:t>
+            </a:r>
+            <a:r>
+              <a:rPr lang="en-US" baseline="30000" dirty="0"/>
+              <a:t>st</a:t>
+            </a:r>
+            <a:r>
+              <a:rPr lang="en-US" dirty="0"/>
+              <a:t>)</a:t>
             </a:r>
           </a:p>
         </p:txBody>
@@ -7861,7 +8063,7 @@
         <p:spPr>
           <a:xfrm>
             <a:off x="668046" y="1764954"/>
-            <a:ext cx="10670514" cy="1499834"/>
+            <a:ext cx="10670514" cy="1804533"/>
           </a:xfrm>
           <a:prstGeom prst="rect">
             <a:avLst/>
@@ -7949,6 +8151,21 @@
               </a:rPr>
               <a:t>Group shall prepare to collect requirements, so that a feedback to SPDX v3 form this group will be possible</a:t>
             </a:r>
+          </a:p>
+          <a:p>
+            <a:pPr>
+              <a:lnSpc>
+                <a:spcPct val="110000"/>
+              </a:lnSpc>
+              <a:spcBef>
+                <a:spcPts val="0"/>
+              </a:spcBef>
+            </a:pPr>
+            <a:endParaRPr lang="en-US" dirty="0">
+              <a:solidFill>
+                <a:schemeClr val="tx1"/>
+              </a:solidFill>
+            </a:endParaRPr>
           </a:p>
         </p:txBody>
       </p:sp>
@@ -10441,13 +10658,83 @@
 
 <file path=customXml/item10.xml><?xml version="1.0" encoding="utf-8"?>
 <p4ppTags>
-  <Name>One object (small) + Navigation</Name>
-  <PpLayout>32</PpLayout>
-  <Index>18</Index>
+  <Name>One object (large)</Name>
+  <PpLayout>16</PpLayout>
+  <Index>10</Index>
 </p4ppTags>
 </file>
 
 <file path=customXml/item11.xml><?xml version="1.0" encoding="utf-8"?>
+<p:properties xmlns:p="http://schemas.microsoft.com/office/2006/metadata/properties" xmlns:xsi="http://www.w3.org/2001/XMLSchema-instance">
+  <documentManagement>
+    <PublishingExpirationDate xmlns="http://schemas.microsoft.com/sharepoint/v3" xsi:nil="true"/>
+    <PublishingStartDate xmlns="http://schemas.microsoft.com/sharepoint/v3" xsi:nil="true"/>
+  </documentManagement>
+</p:properties>
+</file>
+
+<file path=customXml/item12.xml><?xml version="1.0" encoding="utf-8"?>
+<p4ppTags/>
+</file>
+
+<file path=customXml/item13.xml><?xml version="1.0" encoding="utf-8"?>
+<p4ppTags>
+  <Name>Two rows + Navigation</Name>
+  <PpLayout>32</PpLayout>
+  <Index>21</Index>
+</p4ppTags>
+</file>
+
+<file path=customXml/item14.xml><?xml version="1.0" encoding="utf-8"?>
+<?mso-contentType ?>
+<FormTemplates xmlns="http://schemas.microsoft.com/sharepoint/v3/contenttype/forms">
+  <Display>DocumentLibraryForm</Display>
+  <Edit>DocumentLibraryForm</Edit>
+  <New>DocumentLibraryForm</New>
+</FormTemplates>
+</file>
+
+<file path=customXml/item15.xml><?xml version="1.0" encoding="utf-8"?>
+<p4ppTags>
+  <Name>Two columns</Name>
+  <PpLayout>29</PpLayout>
+  <Index>12</Index>
+</p4ppTags>
+</file>
+
+<file path=customXml/item16.xml><?xml version="1.0" encoding="utf-8"?>
+<p4ppTags>
+  <Name>Text + Index</Name>
+  <PpLayout>32</PpLayout>
+  <Index>8</Index>
+</p4ppTags>
+</file>
+
+<file path=customXml/item17.xml><?xml version="1.0" encoding="utf-8"?>
+<p4ppTags>
+  <Name>Four objects</Name>
+  <PpLayout>24</PpLayout>
+  <Index>15</Index>
+</p4ppTags>
+</file>
+
+<file path=customXml/item18.xml><?xml version="1.0" encoding="utf-8"?>
+<p4ppTags>
+  <Name>Free Content</Name>
+  <PpLayout>11</PpLayout>
+  <Index>9</Index>
+</p4ppTags>
+</file>
+
+<file path=customXml/item2.xml><?xml version="1.0" encoding="utf-8"?>
+<p4ppTags>
+  <Name>Three columns + Navigation</Name>
+  <PpLayout>32</PpLayout>
+  <Index>20</Index>
+</p4ppTags>
+</file>
+
+<file path=customXml/item3.xml><?xml version="1.0" encoding="utf-8"?>
 <ct:contentTypeSchema xmlns:ct="http://schemas.microsoft.com/office/2006/metadata/contentType" xmlns:ma="http://schemas.microsoft.com/office/2006/metadata/properties/metaAttributes" ct:_="" ma:_="" ma:contentTypeName="Document" ma:contentTypeID="0x01010026F530587E03684C96E4C14F39C83C8E" ma:contentTypeVersion="1" ma:contentTypeDescription="Create a new document." ma:contentTypeScope="" ma:versionID="a7726241122b1ad33829eba8e69a544b">
   <xsd:schema xmlns:xsd="http://www.w3.org/2001/XMLSchema" xmlns:p="http://schemas.microsoft.com/office/2006/metadata/properties" xmlns:ns1="http://schemas.microsoft.com/sharepoint/v3" targetNamespace="http://schemas.microsoft.com/office/2006/metadata/properties" ma:root="true" ma:fieldsID="ddb0c952b897a810c8a4e377cff6bff8" ns1:_="">
     <xsd:import namespace="http://schemas.microsoft.com/sharepoint/v3"/>
@@ -10513,32 +10800,15 @@
 </ct:contentTypeSchema>
 </file>
 
-<file path=customXml/item12.xml><?xml version="1.0" encoding="utf-8"?>
+<file path=customXml/item4.xml><?xml version="1.0" encoding="utf-8"?>
 <p4ppTags>
-  <Name>Two columns</Name>
-  <PpLayout>29</PpLayout>
-  <Index>12</Index>
+  <Name>One object (large) + Navigation</Name>
+  <PpLayout>32</PpLayout>
+  <Index>17</Index>
 </p4ppTags>
 </file>
 
-<file path=customXml/item13.xml><?xml version="1.0" encoding="utf-8"?>
-<p:properties xmlns:p="http://schemas.microsoft.com/office/2006/metadata/properties" xmlns:xsi="http://www.w3.org/2001/XMLSchema-instance">
-  <documentManagement>
-    <PublishingExpirationDate xmlns="http://schemas.microsoft.com/sharepoint/v3" xsi:nil="true"/>
-    <PublishingStartDate xmlns="http://schemas.microsoft.com/sharepoint/v3" xsi:nil="true"/>
-  </documentManagement>
-</p:properties>
-</file>
-
-<file path=customXml/item14.xml><?xml version="1.0" encoding="utf-8"?>
-<p4ppTags>
-  <Name>Two columns + Navigation</Name>
-  <PpLayout>32</PpLayout>
-  <Index>19</Index>
-</p4ppTags>
-</file>
-
-<file path=customXml/item15.xml><?xml version="1.0" encoding="utf-8"?>
+<file path=customXml/item5.xml><?xml version="1.0" encoding="utf-8"?>
 <p4ppTags>
   <Name>Free Content + Navigation</Name>
   <PpLayout>32</PpLayout>
@@ -10546,43 +10816,15 @@
 </p4ppTags>
 </file>
 
-<file path=customXml/item16.xml><?xml version="1.0" encoding="utf-8"?>
+<file path=customXml/item6.xml><?xml version="1.0" encoding="utf-8"?>
 <p4ppTags>
-  <Name>Free Content</Name>
-  <PpLayout>11</PpLayout>
-  <Index>9</Index>
+  <Name>One object (small) + Navigation</Name>
+  <PpLayout>32</PpLayout>
+  <Index>18</Index>
 </p4ppTags>
 </file>
 
-<file path=customXml/item17.xml><?xml version="1.0" encoding="utf-8"?>
-<p4ppTags>
-  <Name>Text + Index</Name>
-  <PpLayout>32</PpLayout>
-  <Index>8</Index>
-</p4ppTags>
-</file>
-
-<file path=customXml/item18.xml><?xml version="1.0" encoding="utf-8"?>
-<p4ppTags/>
-</file>
-
-<file path=customXml/item2.xml><?xml version="1.0" encoding="utf-8"?>
-<p4ppTags>
-  <Name>Four objects</Name>
-  <PpLayout>24</PpLayout>
-  <Index>15</Index>
-</p4ppTags>
-</file>
-
-<file path=customXml/item3.xml><?xml version="1.0" encoding="utf-8"?>
-<p4ppTags>
-  <Name>Two rows + Navigation</Name>
-  <PpLayout>32</PpLayout>
-  <Index>21</Index>
-</p4ppTags>
-</file>
-
-<file path=customXml/item4.xml><?xml version="1.0" encoding="utf-8"?>
+<file path=customXml/item7.xml><?xml version="1.0" encoding="utf-8"?>
 <p4ppTags>
   <Name>Three columns</Name>
   <PpLayout>32</PpLayout>
@@ -10590,44 +10832,19 @@
 </p4ppTags>
 </file>
 
-<file path=customXml/item5.xml><?xml version="1.0" encoding="utf-8"?>
-<p4ppTags>
-  <Name>One object (large) + Navigation</Name>
-  <PpLayout>32</PpLayout>
-  <Index>17</Index>
-</p4ppTags>
-</file>
-
-<file path=customXml/item6.xml><?xml version="1.0" encoding="utf-8"?>
-<p4ppTags>
-  <Name>Three columns + Navigation</Name>
-  <PpLayout>32</PpLayout>
-  <Index>20</Index>
-</p4ppTags>
-</file>
-
-<file path=customXml/item7.xml><?xml version="1.0" encoding="utf-8"?>
-<?mso-contentType ?>
-<FormTemplates xmlns="http://schemas.microsoft.com/sharepoint/v3/contenttype/forms">
-  <Display>DocumentLibraryForm</Display>
-  <Edit>DocumentLibraryForm</Edit>
-  <New>DocumentLibraryForm</New>
-</FormTemplates>
-</file>
-
 <file path=customXml/item8.xml><?xml version="1.0" encoding="utf-8"?>
 <p4ppTags>
-  <Name>One object (large)</Name>
-  <PpLayout>16</PpLayout>
-  <Index>10</Index>
+  <Name>Two rows</Name>
+  <PpLayout>32</PpLayout>
+  <Index>13</Index>
 </p4ppTags>
 </file>
 
 <file path=customXml/item9.xml><?xml version="1.0" encoding="utf-8"?>
 <p4ppTags>
-  <Name>Two rows</Name>
+  <Name>Two columns + Navigation</Name>
   <PpLayout>32</PpLayout>
-  <Index>13</Index>
+  <Index>19</Index>
 </p4ppTags>
 </file>
 
@@ -10638,12 +10855,77 @@
 </file>
 
 <file path=customXml/itemProps10.xml><?xml version="1.0" encoding="utf-8"?>
-<ds:datastoreItem xmlns:ds="http://schemas.openxmlformats.org/officeDocument/2006/customXml" ds:itemID="{D9FE249F-833E-4CF0-BECB-552D01D7DC9E}">
+<ds:datastoreItem xmlns:ds="http://schemas.openxmlformats.org/officeDocument/2006/customXml" ds:itemID="{80661B8B-A327-44F9-823B-4D9EE0B3EC78}">
   <ds:schemaRefs/>
 </ds:datastoreItem>
 </file>
 
 <file path=customXml/itemProps11.xml><?xml version="1.0" encoding="utf-8"?>
+<ds:datastoreItem xmlns:ds="http://schemas.openxmlformats.org/officeDocument/2006/customXml" ds:itemID="{C3CCD83D-9C91-4A4B-87D6-2A0CC03F9D68}">
+  <ds:schemaRefs>
+    <ds:schemaRef ds:uri="http://purl.org/dc/terms/"/>
+    <ds:schemaRef ds:uri="http://schemas.openxmlformats.org/package/2006/metadata/core-properties"/>
+    <ds:schemaRef ds:uri="http://purl.org/dc/dcmitype/"/>
+    <ds:schemaRef ds:uri="http://schemas.microsoft.com/office/2006/documentManagement/types"/>
+    <ds:schemaRef ds:uri="http://purl.org/dc/elements/1.1/"/>
+    <ds:schemaRef ds:uri="http://schemas.microsoft.com/office/2006/metadata/properties"/>
+    <ds:schemaRef ds:uri="http://schemas.microsoft.com/sharepoint/v3"/>
+    <ds:schemaRef ds:uri="http://www.w3.org/XML/1998/namespace"/>
+  </ds:schemaRefs>
+</ds:datastoreItem>
+</file>
+
+<file path=customXml/itemProps12.xml><?xml version="1.0" encoding="utf-8"?>
+<ds:datastoreItem xmlns:ds="http://schemas.openxmlformats.org/officeDocument/2006/customXml" ds:itemID="{572FBA73-6DBF-45DA-8282-9342320CFAB0}">
+  <ds:schemaRefs/>
+</ds:datastoreItem>
+</file>
+
+<file path=customXml/itemProps13.xml><?xml version="1.0" encoding="utf-8"?>
+<ds:datastoreItem xmlns:ds="http://schemas.openxmlformats.org/officeDocument/2006/customXml" ds:itemID="{6C79E4F8-DCFB-483C-880A-AEEC6AAFC838}">
+  <ds:schemaRefs/>
+</ds:datastoreItem>
+</file>
+
+<file path=customXml/itemProps14.xml><?xml version="1.0" encoding="utf-8"?>
+<ds:datastoreItem xmlns:ds="http://schemas.openxmlformats.org/officeDocument/2006/customXml" ds:itemID="{C770A9D8-EB8A-4EA7-9CCD-8AD3EAF96C52}">
+  <ds:schemaRefs>
+    <ds:schemaRef ds:uri="http://schemas.microsoft.com/sharepoint/v3/contenttype/forms"/>
+  </ds:schemaRefs>
+</ds:datastoreItem>
+</file>
+
+<file path=customXml/itemProps15.xml><?xml version="1.0" encoding="utf-8"?>
+<ds:datastoreItem xmlns:ds="http://schemas.openxmlformats.org/officeDocument/2006/customXml" ds:itemID="{1666F4C2-68F5-4840-A44A-1A646C0925A1}">
+  <ds:schemaRefs/>
+</ds:datastoreItem>
+</file>
+
+<file path=customXml/itemProps16.xml><?xml version="1.0" encoding="utf-8"?>
+<ds:datastoreItem xmlns:ds="http://schemas.openxmlformats.org/officeDocument/2006/customXml" ds:itemID="{7E35FEDB-1F0E-4D67-A313-4AC59C26FF29}">
+  <ds:schemaRefs/>
+</ds:datastoreItem>
+</file>
+
+<file path=customXml/itemProps17.xml><?xml version="1.0" encoding="utf-8"?>
+<ds:datastoreItem xmlns:ds="http://schemas.openxmlformats.org/officeDocument/2006/customXml" ds:itemID="{1581BFFB-B4CE-47A8-BE77-DC1339B1E5A7}">
+  <ds:schemaRefs/>
+</ds:datastoreItem>
+</file>
+
+<file path=customXml/itemProps18.xml><?xml version="1.0" encoding="utf-8"?>
+<ds:datastoreItem xmlns:ds="http://schemas.openxmlformats.org/officeDocument/2006/customXml" ds:itemID="{D8097D0C-BE3E-4AEC-9593-65CFCCB19297}">
+  <ds:schemaRefs/>
+</ds:datastoreItem>
+</file>
+
+<file path=customXml/itemProps2.xml><?xml version="1.0" encoding="utf-8"?>
+<ds:datastoreItem xmlns:ds="http://schemas.openxmlformats.org/officeDocument/2006/customXml" ds:itemID="{85D77EE6-52B7-48BE-9EDB-748F1EBB53DE}">
+  <ds:schemaRefs/>
+</ds:datastoreItem>
+</file>
+
+<file path=customXml/itemProps3.xml><?xml version="1.0" encoding="utf-8"?>
 <ds:datastoreItem xmlns:ds="http://schemas.openxmlformats.org/officeDocument/2006/customXml" ds:itemID="{DDD5559B-0584-4B05-A285-1FEC88814B30}">
   <ds:schemaRefs>
     <ds:schemaRef ds:uri="http://schemas.microsoft.com/office/2006/metadata/contentType"/>
@@ -10660,103 +10942,38 @@
 </ds:datastoreItem>
 </file>
 
-<file path=customXml/itemProps12.xml><?xml version="1.0" encoding="utf-8"?>
-<ds:datastoreItem xmlns:ds="http://schemas.openxmlformats.org/officeDocument/2006/customXml" ds:itemID="{1666F4C2-68F5-4840-A44A-1A646C0925A1}">
+<file path=customXml/itemProps4.xml><?xml version="1.0" encoding="utf-8"?>
+<ds:datastoreItem xmlns:ds="http://schemas.openxmlformats.org/officeDocument/2006/customXml" ds:itemID="{B27F640E-84DF-4F97-BC70-D045F1E6594F}">
   <ds:schemaRefs/>
 </ds:datastoreItem>
 </file>
 
-<file path=customXml/itemProps13.xml><?xml version="1.0" encoding="utf-8"?>
-<ds:datastoreItem xmlns:ds="http://schemas.openxmlformats.org/officeDocument/2006/customXml" ds:itemID="{C3CCD83D-9C91-4A4B-87D6-2A0CC03F9D68}">
-  <ds:schemaRefs>
-    <ds:schemaRef ds:uri="http://purl.org/dc/terms/"/>
-    <ds:schemaRef ds:uri="http://schemas.openxmlformats.org/package/2006/metadata/core-properties"/>
-    <ds:schemaRef ds:uri="http://purl.org/dc/dcmitype/"/>
-    <ds:schemaRef ds:uri="http://schemas.microsoft.com/office/2006/documentManagement/types"/>
-    <ds:schemaRef ds:uri="http://purl.org/dc/elements/1.1/"/>
-    <ds:schemaRef ds:uri="http://schemas.microsoft.com/office/2006/metadata/properties"/>
-    <ds:schemaRef ds:uri="http://schemas.microsoft.com/sharepoint/v3"/>
-    <ds:schemaRef ds:uri="http://www.w3.org/XML/1998/namespace"/>
-  </ds:schemaRefs>
-</ds:datastoreItem>
-</file>
-
-<file path=customXml/itemProps14.xml><?xml version="1.0" encoding="utf-8"?>
-<ds:datastoreItem xmlns:ds="http://schemas.openxmlformats.org/officeDocument/2006/customXml" ds:itemID="{D7BABA95-BFFE-422B-8591-3271669EEA88}">
-  <ds:schemaRefs/>
-</ds:datastoreItem>
-</file>
-
-<file path=customXml/itemProps15.xml><?xml version="1.0" encoding="utf-8"?>
+<file path=customXml/itemProps5.xml><?xml version="1.0" encoding="utf-8"?>
 <ds:datastoreItem xmlns:ds="http://schemas.openxmlformats.org/officeDocument/2006/customXml" ds:itemID="{7CC5F709-E74B-4E5F-A728-923D5062EBEF}">
   <ds:schemaRefs/>
 </ds:datastoreItem>
 </file>
 
-<file path=customXml/itemProps16.xml><?xml version="1.0" encoding="utf-8"?>
-<ds:datastoreItem xmlns:ds="http://schemas.openxmlformats.org/officeDocument/2006/customXml" ds:itemID="{D8097D0C-BE3E-4AEC-9593-65CFCCB19297}">
+<file path=customXml/itemProps6.xml><?xml version="1.0" encoding="utf-8"?>
+<ds:datastoreItem xmlns:ds="http://schemas.openxmlformats.org/officeDocument/2006/customXml" ds:itemID="{D9FE249F-833E-4CF0-BECB-552D01D7DC9E}">
   <ds:schemaRefs/>
 </ds:datastoreItem>
 </file>
 
-<file path=customXml/itemProps17.xml><?xml version="1.0" encoding="utf-8"?>
-<ds:datastoreItem xmlns:ds="http://schemas.openxmlformats.org/officeDocument/2006/customXml" ds:itemID="{7E35FEDB-1F0E-4D67-A313-4AC59C26FF29}">
-  <ds:schemaRefs/>
-</ds:datastoreItem>
-</file>
-
-<file path=customXml/itemProps18.xml><?xml version="1.0" encoding="utf-8"?>
-<ds:datastoreItem xmlns:ds="http://schemas.openxmlformats.org/officeDocument/2006/customXml" ds:itemID="{572FBA73-6DBF-45DA-8282-9342320CFAB0}">
-  <ds:schemaRefs/>
-</ds:datastoreItem>
-</file>
-
-<file path=customXml/itemProps2.xml><?xml version="1.0" encoding="utf-8"?>
-<ds:datastoreItem xmlns:ds="http://schemas.openxmlformats.org/officeDocument/2006/customXml" ds:itemID="{1581BFFB-B4CE-47A8-BE77-DC1339B1E5A7}">
-  <ds:schemaRefs/>
-</ds:datastoreItem>
-</file>
-
-<file path=customXml/itemProps3.xml><?xml version="1.0" encoding="utf-8"?>
-<ds:datastoreItem xmlns:ds="http://schemas.openxmlformats.org/officeDocument/2006/customXml" ds:itemID="{6C79E4F8-DCFB-483C-880A-AEEC6AAFC838}">
-  <ds:schemaRefs/>
-</ds:datastoreItem>
-</file>
-
-<file path=customXml/itemProps4.xml><?xml version="1.0" encoding="utf-8"?>
+<file path=customXml/itemProps7.xml><?xml version="1.0" encoding="utf-8"?>
 <ds:datastoreItem xmlns:ds="http://schemas.openxmlformats.org/officeDocument/2006/customXml" ds:itemID="{15CF3461-70D1-4B54-AFAB-DAFDA0A238CD}">
   <ds:schemaRefs/>
 </ds:datastoreItem>
 </file>
 
-<file path=customXml/itemProps5.xml><?xml version="1.0" encoding="utf-8"?>
-<ds:datastoreItem xmlns:ds="http://schemas.openxmlformats.org/officeDocument/2006/customXml" ds:itemID="{B27F640E-84DF-4F97-BC70-D045F1E6594F}">
-  <ds:schemaRefs/>
-</ds:datastoreItem>
-</file>
-
-<file path=customXml/itemProps6.xml><?xml version="1.0" encoding="utf-8"?>
-<ds:datastoreItem xmlns:ds="http://schemas.openxmlformats.org/officeDocument/2006/customXml" ds:itemID="{85D77EE6-52B7-48BE-9EDB-748F1EBB53DE}">
-  <ds:schemaRefs/>
-</ds:datastoreItem>
-</file>
-
-<file path=customXml/itemProps7.xml><?xml version="1.0" encoding="utf-8"?>
-<ds:datastoreItem xmlns:ds="http://schemas.openxmlformats.org/officeDocument/2006/customXml" ds:itemID="{C770A9D8-EB8A-4EA7-9CCD-8AD3EAF96C52}">
-  <ds:schemaRefs>
-    <ds:schemaRef ds:uri="http://schemas.microsoft.com/sharepoint/v3/contenttype/forms"/>
-  </ds:schemaRefs>
-</ds:datastoreItem>
-</file>
-
 <file path=customXml/itemProps8.xml><?xml version="1.0" encoding="utf-8"?>
-<ds:datastoreItem xmlns:ds="http://schemas.openxmlformats.org/officeDocument/2006/customXml" ds:itemID="{80661B8B-A327-44F9-823B-4D9EE0B3EC78}">
+<ds:datastoreItem xmlns:ds="http://schemas.openxmlformats.org/officeDocument/2006/customXml" ds:itemID="{38AB8DE4-FD9B-4166-BEC3-3F1753596133}">
   <ds:schemaRefs/>
 </ds:datastoreItem>
 </file>
 
 <file path=customXml/itemProps9.xml><?xml version="1.0" encoding="utf-8"?>
-<ds:datastoreItem xmlns:ds="http://schemas.openxmlformats.org/officeDocument/2006/customXml" ds:itemID="{38AB8DE4-FD9B-4166-BEC3-3F1753596133}">
+<ds:datastoreItem xmlns:ds="http://schemas.openxmlformats.org/officeDocument/2006/customXml" ds:itemID="{D7BABA95-BFFE-422B-8591-3271669EEA88}">
   <ds:schemaRefs/>
 </ds:datastoreItem>
 </file>
</xml_diff>